<commit_message>
first draft all the way to the end
</commit_message>
<xml_diff>
--- a/Lecture_Slides/PH 123 Lecture 10.pptx
+++ b/Lecture_Slides/PH 123 Lecture 10.pptx
@@ -5,7 +5,7 @@
     <p:sldMasterId id="2147483648" r:id="rId1"/>
   </p:sldMasterIdLst>
   <p:notesMasterIdLst>
-    <p:notesMasterId r:id="rId19"/>
+    <p:notesMasterId r:id="rId20"/>
   </p:notesMasterIdLst>
   <p:sldIdLst>
     <p:sldId id="293" r:id="rId2"/>
@@ -15,16 +15,17 @@
     <p:sldId id="345" r:id="rId6"/>
     <p:sldId id="298" r:id="rId7"/>
     <p:sldId id="314" r:id="rId8"/>
-    <p:sldId id="315" r:id="rId9"/>
-    <p:sldId id="316" r:id="rId10"/>
-    <p:sldId id="317" r:id="rId11"/>
-    <p:sldId id="299" r:id="rId12"/>
-    <p:sldId id="300" r:id="rId13"/>
-    <p:sldId id="301" r:id="rId14"/>
+    <p:sldId id="1456" r:id="rId9"/>
+    <p:sldId id="315" r:id="rId10"/>
+    <p:sldId id="316" r:id="rId11"/>
+    <p:sldId id="317" r:id="rId12"/>
+    <p:sldId id="299" r:id="rId13"/>
+    <p:sldId id="300" r:id="rId14"/>
     <p:sldId id="302" r:id="rId15"/>
     <p:sldId id="339" r:id="rId16"/>
     <p:sldId id="340" r:id="rId17"/>
     <p:sldId id="294" r:id="rId18"/>
+    <p:sldId id="301" r:id="rId19"/>
   </p:sldIdLst>
   <p:sldSz cx="9144000" cy="6858000" type="screen4x3"/>
   <p:notesSz cx="6858000" cy="9144000"/>
@@ -145,7 +146,7 @@
 <file path=ppt/revisionInfo.xml><?xml version="1.0" encoding="utf-8"?>
 <p1510:revInfo xmlns:a="http://schemas.openxmlformats.org/drawingml/2006/main" xmlns:r="http://schemas.openxmlformats.org/officeDocument/2006/relationships" xmlns:p1510="http://schemas.microsoft.com/office/powerpoint/2015/10/main">
   <p1510:revLst>
-    <p1510:client id="{617507A3-B23C-4814-86A3-AA497BF70DCA}" v="2" dt="2025-04-30T21:18:26.062"/>
+    <p1510:client id="{617507A3-B23C-4814-86A3-AA497BF70DCA}" v="3" dt="2025-05-07T15:37:28.390"/>
   </p1510:revLst>
 </p1510:revInfo>
 </file>
@@ -154,8 +155,8 @@
 <pc:chgInfo xmlns:a="http://schemas.openxmlformats.org/drawingml/2006/main" xmlns:r="http://schemas.openxmlformats.org/officeDocument/2006/relationships" xmlns:ac="http://schemas.microsoft.com/office/drawing/2013/main/command" xmlns:pc="http://schemas.microsoft.com/office/powerpoint/2013/main/command">
   <pc:docChgLst>
     <pc:chgData name="Lines, Todd" userId="afaf7c3a-e8aa-4568-882a-02ad8f9e19b0" providerId="ADAL" clId="{617507A3-B23C-4814-86A3-AA497BF70DCA}"/>
-    <pc:docChg chg="custSel addSld delSld modSld">
-      <pc:chgData name="Lines, Todd" userId="afaf7c3a-e8aa-4568-882a-02ad8f9e19b0" providerId="ADAL" clId="{617507A3-B23C-4814-86A3-AA497BF70DCA}" dt="2025-04-30T21:23:16.841" v="19" actId="47"/>
+    <pc:docChg chg="custSel addSld delSld modSld sldOrd">
+      <pc:chgData name="Lines, Todd" userId="afaf7c3a-e8aa-4568-882a-02ad8f9e19b0" providerId="ADAL" clId="{617507A3-B23C-4814-86A3-AA497BF70DCA}" dt="2025-05-07T15:37:28.389" v="22"/>
       <pc:docMkLst>
         <pc:docMk/>
       </pc:docMkLst>
@@ -362,22 +363,6 @@
           <pc:docMk/>
           <pc:sldMk cId="665056197" sldId="294"/>
         </pc:sldMkLst>
-        <pc:spChg chg="del mod ord">
-          <ac:chgData name="Lines, Todd" userId="afaf7c3a-e8aa-4568-882a-02ad8f9e19b0" providerId="ADAL" clId="{617507A3-B23C-4814-86A3-AA497BF70DCA}" dt="2025-04-30T21:14:20.934" v="12" actId="700"/>
-          <ac:spMkLst>
-            <pc:docMk/>
-            <pc:sldMk cId="665056197" sldId="294"/>
-            <ac:spMk id="2" creationId="{84865BE9-DF7B-6B28-1ECC-6C7F579F367B}"/>
-          </ac:spMkLst>
-        </pc:spChg>
-        <pc:spChg chg="del mod ord">
-          <ac:chgData name="Lines, Todd" userId="afaf7c3a-e8aa-4568-882a-02ad8f9e19b0" providerId="ADAL" clId="{617507A3-B23C-4814-86A3-AA497BF70DCA}" dt="2025-04-30T21:14:20.934" v="12" actId="700"/>
-          <ac:spMkLst>
-            <pc:docMk/>
-            <pc:sldMk cId="665056197" sldId="294"/>
-            <ac:spMk id="3" creationId="{F3CB2E30-CBC1-0093-D01C-8C5BBC117757}"/>
-          </ac:spMkLst>
-        </pc:spChg>
         <pc:spChg chg="add mod ord">
           <ac:chgData name="Lines, Todd" userId="afaf7c3a-e8aa-4568-882a-02ad8f9e19b0" providerId="ADAL" clId="{617507A3-B23C-4814-86A3-AA497BF70DCA}" dt="2025-04-30T21:14:23.337" v="15" actId="20577"/>
           <ac:spMkLst>
@@ -416,8 +401,8 @@
           <pc:sldMk cId="2918768208" sldId="300"/>
         </pc:sldMkLst>
       </pc:sldChg>
-      <pc:sldChg chg="add">
-        <pc:chgData name="Lines, Todd" userId="afaf7c3a-e8aa-4568-882a-02ad8f9e19b0" providerId="ADAL" clId="{617507A3-B23C-4814-86A3-AA497BF70DCA}" dt="2025-04-30T21:16:33.815" v="16"/>
+      <pc:sldChg chg="add ord">
+        <pc:chgData name="Lines, Todd" userId="afaf7c3a-e8aa-4568-882a-02ad8f9e19b0" providerId="ADAL" clId="{617507A3-B23C-4814-86A3-AA497BF70DCA}" dt="2025-05-06T22:10:06.831" v="21"/>
         <pc:sldMkLst>
           <pc:docMk/>
           <pc:sldMk cId="2700378708" sldId="301"/>
@@ -514,6 +499,13 @@
           <pc:sldMk cId="1763055361" sldId="345"/>
         </pc:sldMkLst>
       </pc:sldChg>
+      <pc:sldChg chg="add">
+        <pc:chgData name="Lines, Todd" userId="afaf7c3a-e8aa-4568-882a-02ad8f9e19b0" providerId="ADAL" clId="{617507A3-B23C-4814-86A3-AA497BF70DCA}" dt="2025-05-07T15:37:28.389" v="22"/>
+        <pc:sldMkLst>
+          <pc:docMk/>
+          <pc:sldMk cId="761006191" sldId="1456"/>
+        </pc:sldMkLst>
+      </pc:sldChg>
     </pc:docChg>
   </pc:docChgLst>
   <pc:docChgLst>
@@ -624,7 +616,7 @@
           <a:p>
             <a:fld id="{DDC20DDF-410A-4A2E-BE2B-BF9258AB4EBC}" type="datetimeFigureOut">
               <a:rPr lang="en-US" smtClean="0"/>
-              <a:t>4/30/2025</a:t>
+              <a:t>5/7/2025</a:t>
             </a:fld>
             <a:endParaRPr lang="en-US"/>
           </a:p>
@@ -1185,7 +1177,7 @@
             <a:fld id="{770D32CF-726D-406C-8E04-892C32375105}" type="datetimeFigureOut">
               <a:rPr lang="en-US" smtClean="0"/>
               <a:pPr/>
-              <a:t>4/30/2025</a:t>
+              <a:t>5/7/2025</a:t>
             </a:fld>
             <a:endParaRPr lang="en-US"/>
           </a:p>
@@ -1350,7 +1342,7 @@
             <a:fld id="{770D32CF-726D-406C-8E04-892C32375105}" type="datetimeFigureOut">
               <a:rPr lang="en-US" smtClean="0"/>
               <a:pPr/>
-              <a:t>4/30/2025</a:t>
+              <a:t>5/7/2025</a:t>
             </a:fld>
             <a:endParaRPr lang="en-US"/>
           </a:p>
@@ -1525,7 +1517,7 @@
             <a:fld id="{770D32CF-726D-406C-8E04-892C32375105}" type="datetimeFigureOut">
               <a:rPr lang="en-US" smtClean="0"/>
               <a:pPr/>
-              <a:t>4/30/2025</a:t>
+              <a:t>5/7/2025</a:t>
             </a:fld>
             <a:endParaRPr lang="en-US"/>
           </a:p>
@@ -1690,7 +1682,7 @@
             <a:fld id="{770D32CF-726D-406C-8E04-892C32375105}" type="datetimeFigureOut">
               <a:rPr lang="en-US" smtClean="0"/>
               <a:pPr/>
-              <a:t>4/30/2025</a:t>
+              <a:t>5/7/2025</a:t>
             </a:fld>
             <a:endParaRPr lang="en-US"/>
           </a:p>
@@ -1932,7 +1924,7 @@
             <a:fld id="{770D32CF-726D-406C-8E04-892C32375105}" type="datetimeFigureOut">
               <a:rPr lang="en-US" smtClean="0"/>
               <a:pPr/>
-              <a:t>4/30/2025</a:t>
+              <a:t>5/7/2025</a:t>
             </a:fld>
             <a:endParaRPr lang="en-US"/>
           </a:p>
@@ -2214,7 +2206,7 @@
             <a:fld id="{770D32CF-726D-406C-8E04-892C32375105}" type="datetimeFigureOut">
               <a:rPr lang="en-US" smtClean="0"/>
               <a:pPr/>
-              <a:t>4/30/2025</a:t>
+              <a:t>5/7/2025</a:t>
             </a:fld>
             <a:endParaRPr lang="en-US"/>
           </a:p>
@@ -2630,7 +2622,7 @@
             <a:fld id="{770D32CF-726D-406C-8E04-892C32375105}" type="datetimeFigureOut">
               <a:rPr lang="en-US" smtClean="0"/>
               <a:pPr/>
-              <a:t>4/30/2025</a:t>
+              <a:t>5/7/2025</a:t>
             </a:fld>
             <a:endParaRPr lang="en-US"/>
           </a:p>
@@ -2744,7 +2736,7 @@
             <a:fld id="{770D32CF-726D-406C-8E04-892C32375105}" type="datetimeFigureOut">
               <a:rPr lang="en-US" smtClean="0"/>
               <a:pPr/>
-              <a:t>4/30/2025</a:t>
+              <a:t>5/7/2025</a:t>
             </a:fld>
             <a:endParaRPr lang="en-US"/>
           </a:p>
@@ -2836,7 +2828,7 @@
             <a:fld id="{770D32CF-726D-406C-8E04-892C32375105}" type="datetimeFigureOut">
               <a:rPr lang="en-US" smtClean="0"/>
               <a:pPr/>
-              <a:t>4/30/2025</a:t>
+              <a:t>5/7/2025</a:t>
             </a:fld>
             <a:endParaRPr lang="en-US"/>
           </a:p>
@@ -3108,7 +3100,7 @@
             <a:fld id="{770D32CF-726D-406C-8E04-892C32375105}" type="datetimeFigureOut">
               <a:rPr lang="en-US" smtClean="0"/>
               <a:pPr/>
-              <a:t>4/30/2025</a:t>
+              <a:t>5/7/2025</a:t>
             </a:fld>
             <a:endParaRPr lang="en-US"/>
           </a:p>
@@ -3357,7 +3349,7 @@
             <a:fld id="{770D32CF-726D-406C-8E04-892C32375105}" type="datetimeFigureOut">
               <a:rPr lang="en-US" smtClean="0"/>
               <a:pPr/>
-              <a:t>4/30/2025</a:t>
+              <a:t>5/7/2025</a:t>
             </a:fld>
             <a:endParaRPr lang="en-US"/>
           </a:p>
@@ -3565,7 +3557,7 @@
             <a:fld id="{770D32CF-726D-406C-8E04-892C32375105}" type="datetimeFigureOut">
               <a:rPr lang="en-US" smtClean="0"/>
               <a:pPr/>
-              <a:t>4/30/2025</a:t>
+              <a:t>5/7/2025</a:t>
             </a:fld>
             <a:endParaRPr lang="en-US"/>
           </a:p>
@@ -4003,6 +3995,415 @@
 </file>
 
 <file path=ppt/slides/slide10.xml><?xml version="1.0" encoding="utf-8"?>
+<p:sld xmlns:a="http://schemas.openxmlformats.org/drawingml/2006/main" xmlns:r="http://schemas.openxmlformats.org/officeDocument/2006/relationships" xmlns:p="http://schemas.openxmlformats.org/presentationml/2006/main">
+  <p:cSld>
+    <p:spTree>
+      <p:nvGrpSpPr>
+        <p:cNvPr id="1" name=""/>
+        <p:cNvGrpSpPr/>
+        <p:nvPr/>
+      </p:nvGrpSpPr>
+      <p:grpSpPr>
+        <a:xfrm>
+          <a:off x="0" y="0"/>
+          <a:ext cx="0" cy="0"/>
+          <a:chOff x="0" y="0"/>
+          <a:chExt cx="0" cy="0"/>
+        </a:xfrm>
+      </p:grpSpPr>
+      <p:sp>
+        <p:nvSpPr>
+          <p:cNvPr id="40962" name="Rectangle 2"/>
+          <p:cNvSpPr>
+            <a:spLocks noGrp="1" noChangeArrowheads="1"/>
+          </p:cNvSpPr>
+          <p:nvPr>
+            <p:ph type="title"/>
+          </p:nvPr>
+        </p:nvSpPr>
+        <p:spPr/>
+        <p:txBody>
+          <a:bodyPr/>
+          <a:lstStyle/>
+          <a:p>
+            <a:pPr eaLnBrk="1" hangingPunct="1"/>
+            <a:r>
+              <a:rPr lang="en-US"/>
+              <a:t>Moving Detector</a:t>
+            </a:r>
+          </a:p>
+        </p:txBody>
+      </p:sp>
+      <p:grpSp>
+        <p:nvGrpSpPr>
+          <p:cNvPr id="2" name="Group 4"/>
+          <p:cNvGrpSpPr>
+            <a:grpSpLocks/>
+          </p:cNvGrpSpPr>
+          <p:nvPr/>
+        </p:nvGrpSpPr>
+        <p:grpSpPr bwMode="auto">
+          <a:xfrm>
+            <a:off x="2517775" y="1895475"/>
+            <a:ext cx="4557713" cy="4386263"/>
+            <a:chOff x="1586" y="1194"/>
+            <a:chExt cx="2871" cy="2763"/>
+          </a:xfrm>
+        </p:grpSpPr>
+        <p:grpSp>
+          <p:nvGrpSpPr>
+            <p:cNvPr id="3" name="Group 5"/>
+            <p:cNvGrpSpPr>
+              <a:grpSpLocks/>
+            </p:cNvGrpSpPr>
+            <p:nvPr/>
+          </p:nvGrpSpPr>
+          <p:grpSpPr bwMode="auto">
+            <a:xfrm>
+              <a:off x="1586" y="1194"/>
+              <a:ext cx="2871" cy="2763"/>
+              <a:chOff x="1056" y="1824"/>
+              <a:chExt cx="1536" cy="1584"/>
+            </a:xfrm>
+          </p:grpSpPr>
+          <p:sp>
+            <p:nvSpPr>
+              <p:cNvPr id="40968" name="Oval 6"/>
+              <p:cNvSpPr>
+                <a:spLocks noChangeArrowheads="1"/>
+              </p:cNvSpPr>
+              <p:nvPr/>
+            </p:nvSpPr>
+            <p:spPr bwMode="auto">
+              <a:xfrm>
+                <a:off x="1056" y="1824"/>
+                <a:ext cx="1536" cy="1584"/>
+              </a:xfrm>
+              <a:prstGeom prst="ellipse">
+                <a:avLst/>
+              </a:prstGeom>
+              <a:solidFill>
+                <a:srgbClr val="FFFFFF"/>
+              </a:solidFill>
+              <a:ln w="9525" algn="ctr">
+                <a:solidFill>
+                  <a:schemeClr val="tx1"/>
+                </a:solidFill>
+                <a:round/>
+                <a:headEnd/>
+                <a:tailEnd/>
+              </a:ln>
+            </p:spPr>
+            <p:txBody>
+              <a:bodyPr wrap="none" anchor="ctr"/>
+              <a:lstStyle/>
+              <a:p>
+                <a:endParaRPr lang="en-US"/>
+              </a:p>
+            </p:txBody>
+          </p:sp>
+          <p:sp>
+            <p:nvSpPr>
+              <p:cNvPr id="40969" name="Oval 7"/>
+              <p:cNvSpPr>
+                <a:spLocks noChangeArrowheads="1"/>
+              </p:cNvSpPr>
+              <p:nvPr/>
+            </p:nvSpPr>
+            <p:spPr bwMode="auto">
+              <a:xfrm>
+                <a:off x="1224" y="1992"/>
+                <a:ext cx="1200" cy="1248"/>
+              </a:xfrm>
+              <a:prstGeom prst="ellipse">
+                <a:avLst/>
+              </a:prstGeom>
+              <a:solidFill>
+                <a:srgbClr val="FFFFFF"/>
+              </a:solidFill>
+              <a:ln w="9525" algn="ctr">
+                <a:solidFill>
+                  <a:schemeClr val="tx1"/>
+                </a:solidFill>
+                <a:round/>
+                <a:headEnd/>
+                <a:tailEnd/>
+              </a:ln>
+            </p:spPr>
+            <p:txBody>
+              <a:bodyPr wrap="none" anchor="ctr"/>
+              <a:lstStyle/>
+              <a:p>
+                <a:endParaRPr lang="en-US"/>
+              </a:p>
+            </p:txBody>
+          </p:sp>
+          <p:sp>
+            <p:nvSpPr>
+              <p:cNvPr id="40970" name="Oval 8"/>
+              <p:cNvSpPr>
+                <a:spLocks noChangeArrowheads="1"/>
+              </p:cNvSpPr>
+              <p:nvPr/>
+            </p:nvSpPr>
+            <p:spPr bwMode="auto">
+              <a:xfrm>
+                <a:off x="1392" y="2136"/>
+                <a:ext cx="864" cy="960"/>
+              </a:xfrm>
+              <a:prstGeom prst="ellipse">
+                <a:avLst/>
+              </a:prstGeom>
+              <a:solidFill>
+                <a:srgbClr val="FFFFFF"/>
+              </a:solidFill>
+              <a:ln w="9525" algn="ctr">
+                <a:solidFill>
+                  <a:schemeClr val="tx1"/>
+                </a:solidFill>
+                <a:round/>
+                <a:headEnd/>
+                <a:tailEnd/>
+              </a:ln>
+            </p:spPr>
+            <p:txBody>
+              <a:bodyPr wrap="none" anchor="ctr"/>
+              <a:lstStyle/>
+              <a:p>
+                <a:endParaRPr lang="en-US"/>
+              </a:p>
+            </p:txBody>
+          </p:sp>
+          <p:sp>
+            <p:nvSpPr>
+              <p:cNvPr id="40971" name="Oval 9"/>
+              <p:cNvSpPr>
+                <a:spLocks noChangeArrowheads="1"/>
+              </p:cNvSpPr>
+              <p:nvPr/>
+            </p:nvSpPr>
+            <p:spPr bwMode="auto">
+              <a:xfrm>
+                <a:off x="1512" y="2256"/>
+                <a:ext cx="624" cy="720"/>
+              </a:xfrm>
+              <a:prstGeom prst="ellipse">
+                <a:avLst/>
+              </a:prstGeom>
+              <a:solidFill>
+                <a:srgbClr val="FFFFFF"/>
+              </a:solidFill>
+              <a:ln w="9525" algn="ctr">
+                <a:solidFill>
+                  <a:schemeClr val="tx1"/>
+                </a:solidFill>
+                <a:round/>
+                <a:headEnd/>
+                <a:tailEnd/>
+              </a:ln>
+            </p:spPr>
+            <p:txBody>
+              <a:bodyPr wrap="none" anchor="ctr"/>
+              <a:lstStyle/>
+              <a:p>
+                <a:endParaRPr lang="en-US"/>
+              </a:p>
+            </p:txBody>
+          </p:sp>
+          <p:sp>
+            <p:nvSpPr>
+              <p:cNvPr id="40972" name="Oval 10"/>
+              <p:cNvSpPr>
+                <a:spLocks noChangeArrowheads="1"/>
+              </p:cNvSpPr>
+              <p:nvPr/>
+            </p:nvSpPr>
+            <p:spPr bwMode="auto">
+              <a:xfrm>
+                <a:off x="1644" y="2400"/>
+                <a:ext cx="360" cy="432"/>
+              </a:xfrm>
+              <a:prstGeom prst="ellipse">
+                <a:avLst/>
+              </a:prstGeom>
+              <a:solidFill>
+                <a:srgbClr val="FFFFFF"/>
+              </a:solidFill>
+              <a:ln w="9525" algn="ctr">
+                <a:solidFill>
+                  <a:schemeClr val="tx1"/>
+                </a:solidFill>
+                <a:round/>
+                <a:headEnd/>
+                <a:tailEnd/>
+              </a:ln>
+            </p:spPr>
+            <p:txBody>
+              <a:bodyPr wrap="none" anchor="ctr"/>
+              <a:lstStyle/>
+              <a:p>
+                <a:endParaRPr lang="en-US"/>
+              </a:p>
+            </p:txBody>
+          </p:sp>
+          <p:sp>
+            <p:nvSpPr>
+              <p:cNvPr id="40973" name="Oval 11"/>
+              <p:cNvSpPr>
+                <a:spLocks noChangeArrowheads="1"/>
+              </p:cNvSpPr>
+              <p:nvPr/>
+            </p:nvSpPr>
+            <p:spPr bwMode="auto">
+              <a:xfrm>
+                <a:off x="1752" y="2520"/>
+                <a:ext cx="144" cy="192"/>
+              </a:xfrm>
+              <a:prstGeom prst="ellipse">
+                <a:avLst/>
+              </a:prstGeom>
+              <a:solidFill>
+                <a:srgbClr val="FFFFFF"/>
+              </a:solidFill>
+              <a:ln w="9525" algn="ctr">
+                <a:solidFill>
+                  <a:schemeClr val="tx1"/>
+                </a:solidFill>
+                <a:round/>
+                <a:headEnd/>
+                <a:tailEnd/>
+              </a:ln>
+            </p:spPr>
+            <p:txBody>
+              <a:bodyPr wrap="none" anchor="ctr"/>
+              <a:lstStyle/>
+              <a:p>
+                <a:endParaRPr lang="en-US"/>
+              </a:p>
+            </p:txBody>
+          </p:sp>
+          <p:sp>
+            <p:nvSpPr>
+              <p:cNvPr id="40974" name="Oval 12"/>
+              <p:cNvSpPr>
+                <a:spLocks noChangeArrowheads="1"/>
+              </p:cNvSpPr>
+              <p:nvPr/>
+            </p:nvSpPr>
+            <p:spPr bwMode="auto">
+              <a:xfrm>
+                <a:off x="1800" y="2592"/>
+                <a:ext cx="48" cy="48"/>
+              </a:xfrm>
+              <a:prstGeom prst="ellipse">
+                <a:avLst/>
+              </a:prstGeom>
+              <a:solidFill>
+                <a:schemeClr val="tx1"/>
+              </a:solidFill>
+              <a:ln w="9525" algn="ctr">
+                <a:solidFill>
+                  <a:schemeClr val="tx1"/>
+                </a:solidFill>
+                <a:round/>
+                <a:headEnd/>
+                <a:tailEnd/>
+              </a:ln>
+            </p:spPr>
+            <p:txBody>
+              <a:bodyPr wrap="none" anchor="ctr"/>
+              <a:lstStyle/>
+              <a:p>
+                <a:endParaRPr lang="en-US"/>
+              </a:p>
+            </p:txBody>
+          </p:sp>
+        </p:grpSp>
+        <p:sp>
+          <p:nvSpPr>
+            <p:cNvPr id="40966" name="Oval 13"/>
+            <p:cNvSpPr>
+              <a:spLocks noChangeArrowheads="1"/>
+            </p:cNvSpPr>
+            <p:nvPr/>
+          </p:nvSpPr>
+          <p:spPr bwMode="auto">
+            <a:xfrm>
+              <a:off x="3927" y="2455"/>
+              <a:ext cx="119" cy="119"/>
+            </a:xfrm>
+            <a:prstGeom prst="ellipse">
+              <a:avLst/>
+            </a:prstGeom>
+            <a:solidFill>
+              <a:schemeClr val="accent1"/>
+            </a:solidFill>
+            <a:ln w="9525" algn="ctr">
+              <a:solidFill>
+                <a:schemeClr val="tx1"/>
+              </a:solidFill>
+              <a:round/>
+              <a:headEnd/>
+              <a:tailEnd/>
+            </a:ln>
+          </p:spPr>
+          <p:txBody>
+            <a:bodyPr wrap="none" anchor="ctr"/>
+            <a:lstStyle/>
+            <a:p>
+              <a:endParaRPr lang="en-US"/>
+            </a:p>
+          </p:txBody>
+        </p:sp>
+        <p:sp>
+          <p:nvSpPr>
+            <p:cNvPr id="40967" name="Line 14"/>
+            <p:cNvSpPr>
+              <a:spLocks noChangeShapeType="1"/>
+            </p:cNvSpPr>
+            <p:nvPr/>
+          </p:nvSpPr>
+          <p:spPr bwMode="auto">
+            <a:xfrm flipH="1">
+              <a:off x="3675" y="2515"/>
+              <a:ext cx="256" cy="0"/>
+            </a:xfrm>
+            <a:prstGeom prst="line">
+              <a:avLst/>
+            </a:prstGeom>
+            <a:noFill/>
+            <a:ln w="38100">
+              <a:solidFill>
+                <a:srgbClr val="FF0000"/>
+              </a:solidFill>
+              <a:round/>
+              <a:headEnd/>
+              <a:tailEnd type="triangle" w="med" len="med"/>
+            </a:ln>
+          </p:spPr>
+          <p:txBody>
+            <a:bodyPr wrap="none" anchor="ctr"/>
+            <a:lstStyle/>
+            <a:p>
+              <a:endParaRPr lang="en-US"/>
+            </a:p>
+          </p:txBody>
+        </p:sp>
+      </p:grpSp>
+    </p:spTree>
+    <p:extLst>
+      <p:ext uri="{BB962C8B-B14F-4D97-AF65-F5344CB8AC3E}">
+        <p14:creationId xmlns:p14="http://schemas.microsoft.com/office/powerpoint/2010/main" val="1734463390"/>
+      </p:ext>
+    </p:extLst>
+  </p:cSld>
+  <p:clrMapOvr>
+    <a:masterClrMapping/>
+  </p:clrMapOvr>
+</p:sld>
+</file>
+
+<file path=ppt/slides/slide11.xml><?xml version="1.0" encoding="utf-8"?>
 <p:sld xmlns:a="http://schemas.openxmlformats.org/drawingml/2006/main" xmlns:r="http://schemas.openxmlformats.org/officeDocument/2006/relationships" xmlns:p="http://schemas.openxmlformats.org/presentationml/2006/main">
   <p:cSld>
     <p:spTree>
@@ -4411,177 +4812,6 @@
 </p:sld>
 </file>
 
-<file path=ppt/slides/slide11.xml><?xml version="1.0" encoding="utf-8"?>
-<p:sld xmlns:a="http://schemas.openxmlformats.org/drawingml/2006/main" xmlns:r="http://schemas.openxmlformats.org/officeDocument/2006/relationships" xmlns:p="http://schemas.openxmlformats.org/presentationml/2006/main">
-  <p:cSld>
-    <p:spTree>
-      <p:nvGrpSpPr>
-        <p:cNvPr id="1" name=""/>
-        <p:cNvGrpSpPr/>
-        <p:nvPr/>
-      </p:nvGrpSpPr>
-      <p:grpSpPr>
-        <a:xfrm>
-          <a:off x="0" y="0"/>
-          <a:ext cx="0" cy="0"/>
-          <a:chOff x="0" y="0"/>
-          <a:chExt cx="0" cy="0"/>
-        </a:xfrm>
-      </p:grpSpPr>
-      <p:sp>
-        <p:nvSpPr>
-          <p:cNvPr id="68611" name="Rectangle 2"/>
-          <p:cNvSpPr>
-            <a:spLocks noGrp="1" noChangeArrowheads="1"/>
-          </p:cNvSpPr>
-          <p:nvPr>
-            <p:ph type="title"/>
-          </p:nvPr>
-        </p:nvSpPr>
-        <p:spPr/>
-        <p:txBody>
-          <a:bodyPr>
-            <a:normAutofit fontScale="90000"/>
-          </a:bodyPr>
-          <a:lstStyle/>
-          <a:p>
-            <a:r>
-              <a:rPr lang="en-US" dirty="0"/>
-              <a:t>Question 223.5.2 Question 123.22.14</a:t>
-            </a:r>
-          </a:p>
-        </p:txBody>
-      </p:sp>
-      <p:sp>
-        <p:nvSpPr>
-          <p:cNvPr id="68612" name="Rectangle 3"/>
-          <p:cNvSpPr>
-            <a:spLocks noGrp="1" noChangeArrowheads="1"/>
-          </p:cNvSpPr>
-          <p:nvPr>
-            <p:ph idx="1"/>
-          </p:nvPr>
-        </p:nvSpPr>
-        <p:spPr/>
-        <p:txBody>
-          <a:bodyPr/>
-          <a:lstStyle/>
-          <a:p>
-            <a:pPr marL="609600" indent="-609600" eaLnBrk="1" hangingPunct="1">
-              <a:lnSpc>
-                <a:spcPct val="90000"/>
-              </a:lnSpc>
-              <a:buFontTx/>
-              <a:buNone/>
-            </a:pPr>
-            <a:r>
-              <a:rPr lang="en-US" sz="2800" dirty="0"/>
-              <a:t>A train passes you while blowing its whistle. Describe the frequency change</a:t>
-            </a:r>
-          </a:p>
-          <a:p>
-            <a:pPr marL="609600" indent="-609600" eaLnBrk="1" hangingPunct="1">
-              <a:lnSpc>
-                <a:spcPct val="90000"/>
-              </a:lnSpc>
-              <a:buFontTx/>
-              <a:buAutoNum type="alphaLcParenR"/>
-            </a:pPr>
-            <a:r>
-              <a:rPr lang="en-US" sz="2800" dirty="0"/>
-              <a:t>The change is nearly instantaneous </a:t>
-            </a:r>
-          </a:p>
-          <a:p>
-            <a:pPr marL="609600" indent="-609600" eaLnBrk="1" hangingPunct="1">
-              <a:lnSpc>
-                <a:spcPct val="90000"/>
-              </a:lnSpc>
-              <a:buFontTx/>
-              <a:buAutoNum type="alphaLcParenR"/>
-            </a:pPr>
-            <a:r>
-              <a:rPr lang="en-US" sz="2800" dirty="0"/>
-              <a:t>The change is gradual, as the train approaches the frequency changes proportionately with the distance from you</a:t>
-            </a:r>
-          </a:p>
-          <a:p>
-            <a:pPr marL="609600" indent="-609600" eaLnBrk="1" hangingPunct="1">
-              <a:lnSpc>
-                <a:spcPct val="90000"/>
-              </a:lnSpc>
-              <a:buFontTx/>
-              <a:buAutoNum type="alphaLcParenR"/>
-            </a:pPr>
-            <a:r>
-              <a:rPr lang="en-US" sz="2800" dirty="0"/>
-              <a:t>The change is gradual, as the train approaches the frequency changes inverse proportionately with the distance from you</a:t>
-            </a:r>
-          </a:p>
-          <a:p>
-            <a:pPr marL="609600" indent="-609600" eaLnBrk="1" hangingPunct="1">
-              <a:lnSpc>
-                <a:spcPct val="90000"/>
-              </a:lnSpc>
-              <a:buFontTx/>
-              <a:buAutoNum type="alphaLcParenR"/>
-            </a:pPr>
-            <a:r>
-              <a:rPr lang="en-US" sz="2800" dirty="0"/>
-              <a:t>Can’t tell</a:t>
-            </a:r>
-          </a:p>
-          <a:p>
-            <a:pPr marL="609600" indent="-609600" eaLnBrk="1" hangingPunct="1">
-              <a:lnSpc>
-                <a:spcPct val="90000"/>
-              </a:lnSpc>
-              <a:buFontTx/>
-              <a:buAutoNum type="alphaLcParenR"/>
-            </a:pPr>
-            <a:endParaRPr lang="en-US" sz="2800" dirty="0"/>
-          </a:p>
-        </p:txBody>
-      </p:sp>
-      <p:sp>
-        <p:nvSpPr>
-          <p:cNvPr id="68610" name="Slide Number Placeholder 5"/>
-          <p:cNvSpPr>
-            <a:spLocks noGrp="1"/>
-          </p:cNvSpPr>
-          <p:nvPr>
-            <p:ph type="sldNum" sz="quarter" idx="12"/>
-          </p:nvPr>
-        </p:nvSpPr>
-        <p:spPr>
-          <a:noFill/>
-        </p:spPr>
-        <p:txBody>
-          <a:bodyPr/>
-          <a:lstStyle/>
-          <a:p>
-            <a:fld id="{23A722F0-04E0-4C85-BB4F-F38C170A22CE}" type="slidenum">
-              <a:rPr lang="en-US" smtClean="0"/>
-              <a:pPr/>
-              <a:t>11</a:t>
-            </a:fld>
-            <a:endParaRPr lang="en-US"/>
-          </a:p>
-        </p:txBody>
-      </p:sp>
-    </p:spTree>
-    <p:extLst>
-      <p:ext uri="{BB962C8B-B14F-4D97-AF65-F5344CB8AC3E}">
-        <p14:creationId xmlns:p14="http://schemas.microsoft.com/office/powerpoint/2010/main" val="3674213391"/>
-      </p:ext>
-    </p:extLst>
-  </p:cSld>
-  <p:clrMapOvr>
-    <a:masterClrMapping/>
-  </p:clrMapOvr>
-</p:sld>
-</file>
-
 <file path=ppt/slides/slide12.xml><?xml version="1.0" encoding="utf-8"?>
 <p:sld xmlns:a="http://schemas.openxmlformats.org/drawingml/2006/main" xmlns:r="http://schemas.openxmlformats.org/officeDocument/2006/relationships" xmlns:p="http://schemas.openxmlformats.org/presentationml/2006/main">
   <p:cSld>
@@ -4601,9 +4831,9 @@
       </p:grpSpPr>
       <p:sp>
         <p:nvSpPr>
-          <p:cNvPr id="601089" name="Title 1"/>
-          <p:cNvSpPr>
-            <a:spLocks noGrp="1"/>
+          <p:cNvPr id="68611" name="Rectangle 2"/>
+          <p:cNvSpPr>
+            <a:spLocks noGrp="1" noChangeArrowheads="1"/>
           </p:cNvSpPr>
           <p:nvPr>
             <p:ph type="title"/>
@@ -4618,16 +4848,16 @@
           <a:p>
             <a:r>
               <a:rPr lang="en-US" dirty="0"/>
-              <a:t>Question 223.5.3 Question 123.22.15</a:t>
-            </a:r>
-          </a:p>
-        </p:txBody>
-      </p:sp>
-      <p:sp>
-        <p:nvSpPr>
-          <p:cNvPr id="3" name="Content Placeholder 2"/>
-          <p:cNvSpPr>
-            <a:spLocks noGrp="1"/>
+              <a:t>Question 223.5.2 Question 123.22.14</a:t>
+            </a:r>
+          </a:p>
+        </p:txBody>
+      </p:sp>
+      <p:sp>
+        <p:nvSpPr>
+          <p:cNvPr id="68612" name="Rectangle 3"/>
+          <p:cNvSpPr>
+            <a:spLocks noGrp="1" noChangeArrowheads="1"/>
           </p:cNvSpPr>
           <p:nvPr>
             <p:ph idx="1"/>
@@ -4635,71 +4865,115 @@
         </p:nvSpPr>
         <p:spPr/>
         <p:txBody>
-          <a:bodyPr>
-            <a:normAutofit lnSpcReduction="10000"/>
-          </a:bodyPr>
+          <a:bodyPr/>
           <a:lstStyle/>
           <a:p>
-            <a:pPr>
+            <a:pPr marL="609600" indent="-609600" eaLnBrk="1" hangingPunct="1">
+              <a:lnSpc>
+                <a:spcPct val="90000"/>
+              </a:lnSpc>
               <a:buFontTx/>
               <a:buNone/>
-              <a:defRPr/>
             </a:pPr>
             <a:r>
-              <a:rPr lang="en-US" dirty="0"/>
-              <a:t>You are sitting on the Hogwarts Express. It  is just leaving the station. The whistle blows. The engineer (if there is one) hears a perfect middle C (256 Hz). What do you hear as the train leaves?</a:t>
-            </a:r>
-          </a:p>
-          <a:p>
-            <a:pPr marL="514350" indent="-514350">
+              <a:rPr lang="en-US" sz="2800" dirty="0"/>
+              <a:t>A train passes you while blowing its whistle. Describe the frequency change</a:t>
+            </a:r>
+          </a:p>
+          <a:p>
+            <a:pPr marL="609600" indent="-609600" eaLnBrk="1" hangingPunct="1">
+              <a:lnSpc>
+                <a:spcPct val="90000"/>
+              </a:lnSpc>
               <a:buFontTx/>
               <a:buAutoNum type="alphaLcParenR"/>
-              <a:defRPr/>
             </a:pPr>
             <a:r>
-              <a:rPr lang="en-US" dirty="0"/>
-              <a:t>A higher pitch than 256 Hz</a:t>
-            </a:r>
-          </a:p>
-          <a:p>
-            <a:pPr marL="514350" indent="-514350">
+              <a:rPr lang="en-US" sz="2800" dirty="0"/>
+              <a:t>The change is nearly instantaneous </a:t>
+            </a:r>
+          </a:p>
+          <a:p>
+            <a:pPr marL="609600" indent="-609600" eaLnBrk="1" hangingPunct="1">
+              <a:lnSpc>
+                <a:spcPct val="90000"/>
+              </a:lnSpc>
               <a:buFontTx/>
               <a:buAutoNum type="alphaLcParenR"/>
-              <a:defRPr/>
             </a:pPr>
             <a:r>
-              <a:rPr lang="en-US" dirty="0"/>
-              <a:t>A lower pitch than 256 Hz</a:t>
-            </a:r>
-          </a:p>
-          <a:p>
-            <a:pPr marL="514350" indent="-514350">
+              <a:rPr lang="en-US" sz="2800" dirty="0"/>
+              <a:t>The change is gradual, as the train approaches the frequency changes proportionately with the distance from you</a:t>
+            </a:r>
+          </a:p>
+          <a:p>
+            <a:pPr marL="609600" indent="-609600" eaLnBrk="1" hangingPunct="1">
+              <a:lnSpc>
+                <a:spcPct val="90000"/>
+              </a:lnSpc>
               <a:buFontTx/>
               <a:buAutoNum type="alphaLcParenR"/>
-              <a:defRPr/>
             </a:pPr>
             <a:r>
-              <a:rPr lang="en-US" dirty="0"/>
-              <a:t>Middle C (256 Hz)</a:t>
-            </a:r>
-          </a:p>
-          <a:p>
-            <a:pPr marL="514350" indent="-514350">
+              <a:rPr lang="en-US" sz="2800" dirty="0"/>
+              <a:t>The change is gradual, as the train approaches the frequency changes inverse proportionately with the distance from you</a:t>
+            </a:r>
+          </a:p>
+          <a:p>
+            <a:pPr marL="609600" indent="-609600" eaLnBrk="1" hangingPunct="1">
+              <a:lnSpc>
+                <a:spcPct val="90000"/>
+              </a:lnSpc>
               <a:buFontTx/>
               <a:buAutoNum type="alphaLcParenR"/>
-              <a:defRPr/>
             </a:pPr>
             <a:r>
-              <a:rPr lang="en-US" dirty="0"/>
-              <a:t>Nothing</a:t>
-            </a:r>
+              <a:rPr lang="en-US" sz="2800" dirty="0"/>
+              <a:t>Can’t tell</a:t>
+            </a:r>
+          </a:p>
+          <a:p>
+            <a:pPr marL="609600" indent="-609600" eaLnBrk="1" hangingPunct="1">
+              <a:lnSpc>
+                <a:spcPct val="90000"/>
+              </a:lnSpc>
+              <a:buFontTx/>
+              <a:buAutoNum type="alphaLcParenR"/>
+            </a:pPr>
+            <a:endParaRPr lang="en-US" sz="2800" dirty="0"/>
+          </a:p>
+        </p:txBody>
+      </p:sp>
+      <p:sp>
+        <p:nvSpPr>
+          <p:cNvPr id="68610" name="Slide Number Placeholder 5"/>
+          <p:cNvSpPr>
+            <a:spLocks noGrp="1"/>
+          </p:cNvSpPr>
+          <p:nvPr>
+            <p:ph type="sldNum" sz="quarter" idx="12"/>
+          </p:nvPr>
+        </p:nvSpPr>
+        <p:spPr>
+          <a:noFill/>
+        </p:spPr>
+        <p:txBody>
+          <a:bodyPr/>
+          <a:lstStyle/>
+          <a:p>
+            <a:fld id="{23A722F0-04E0-4C85-BB4F-F38C170A22CE}" type="slidenum">
+              <a:rPr lang="en-US" smtClean="0"/>
+              <a:pPr/>
+              <a:t>12</a:t>
+            </a:fld>
+            <a:endParaRPr lang="en-US"/>
           </a:p>
         </p:txBody>
       </p:sp>
     </p:spTree>
     <p:extLst>
       <p:ext uri="{BB962C8B-B14F-4D97-AF65-F5344CB8AC3E}">
-        <p14:creationId xmlns:p14="http://schemas.microsoft.com/office/powerpoint/2010/main" val="2918768208"/>
+        <p14:creationId xmlns:p14="http://schemas.microsoft.com/office/powerpoint/2010/main" val="3674213391"/>
       </p:ext>
     </p:extLst>
   </p:cSld>
@@ -4728,9 +5002,9 @@
       </p:grpSpPr>
       <p:sp>
         <p:nvSpPr>
-          <p:cNvPr id="69635" name="Rectangle 2"/>
-          <p:cNvSpPr>
-            <a:spLocks noGrp="1" noChangeArrowheads="1"/>
+          <p:cNvPr id="601089" name="Title 1"/>
+          <p:cNvSpPr>
+            <a:spLocks noGrp="1"/>
           </p:cNvSpPr>
           <p:nvPr>
             <p:ph type="title"/>
@@ -4738,22 +5012,23 @@
         </p:nvSpPr>
         <p:spPr/>
         <p:txBody>
-          <a:bodyPr/>
+          <a:bodyPr>
+            <a:normAutofit fontScale="90000"/>
+          </a:bodyPr>
           <a:lstStyle/>
           <a:p>
-            <a:pPr eaLnBrk="1" hangingPunct="1"/>
             <a:r>
               <a:rPr lang="en-US" dirty="0"/>
-              <a:t>Question 225.5.4</a:t>
-            </a:r>
-          </a:p>
-        </p:txBody>
-      </p:sp>
-      <p:sp>
-        <p:nvSpPr>
-          <p:cNvPr id="69636" name="Rectangle 3"/>
-          <p:cNvSpPr>
-            <a:spLocks noGrp="1" noChangeArrowheads="1"/>
+              <a:t>Question 223.5.3 Question 123.22.15</a:t>
+            </a:r>
+          </a:p>
+        </p:txBody>
+      </p:sp>
+      <p:sp>
+        <p:nvSpPr>
+          <p:cNvPr id="3" name="Content Placeholder 2"/>
+          <p:cNvSpPr>
+            <a:spLocks noGrp="1"/>
           </p:cNvSpPr>
           <p:nvPr>
             <p:ph idx="1"/>
@@ -4761,92 +5036,71 @@
         </p:nvSpPr>
         <p:spPr/>
         <p:txBody>
-          <a:bodyPr/>
+          <a:bodyPr>
+            <a:normAutofit lnSpcReduction="10000"/>
+          </a:bodyPr>
           <a:lstStyle/>
           <a:p>
-            <a:pPr marL="609600" indent="-609600" eaLnBrk="1" hangingPunct="1">
-              <a:lnSpc>
-                <a:spcPct val="90000"/>
-              </a:lnSpc>
+            <a:pPr>
               <a:buFontTx/>
               <a:buNone/>
+              <a:defRPr/>
             </a:pPr>
             <a:r>
               <a:rPr lang="en-US" dirty="0"/>
-              <a:t>Often a single jet will create two sonic booms, why?</a:t>
-            </a:r>
-          </a:p>
-          <a:p>
-            <a:pPr marL="609600" indent="-609600" eaLnBrk="1" hangingPunct="1">
-              <a:lnSpc>
-                <a:spcPct val="90000"/>
-              </a:lnSpc>
+              <a:t>You are sitting on the Hogwarts Express. It  is just leaving the station. The whistle blows. The engineer (if there is one) hears a perfect middle C (256 Hz). What do you hear as the train leaves?</a:t>
+            </a:r>
+          </a:p>
+          <a:p>
+            <a:pPr marL="514350" indent="-514350">
               <a:buFontTx/>
               <a:buAutoNum type="alphaLcParenR"/>
+              <a:defRPr/>
             </a:pPr>
             <a:r>
               <a:rPr lang="en-US" dirty="0"/>
-              <a:t>One is from the plane and one is from the condensation trail that follows the plane</a:t>
-            </a:r>
-          </a:p>
-          <a:p>
-            <a:pPr marL="609600" indent="-609600" eaLnBrk="1" hangingPunct="1">
-              <a:lnSpc>
-                <a:spcPct val="90000"/>
-              </a:lnSpc>
+              <a:t>A higher pitch than 256 Hz</a:t>
+            </a:r>
+          </a:p>
+          <a:p>
+            <a:pPr marL="514350" indent="-514350">
               <a:buFontTx/>
               <a:buAutoNum type="alphaLcParenR"/>
+              <a:defRPr/>
             </a:pPr>
             <a:r>
               <a:rPr lang="en-US" dirty="0"/>
-              <a:t>The nose and the tail both act as wave sources</a:t>
-            </a:r>
-          </a:p>
-          <a:p>
-            <a:pPr marL="609600" indent="-609600" eaLnBrk="1" hangingPunct="1">
-              <a:lnSpc>
-                <a:spcPct val="90000"/>
-              </a:lnSpc>
+              <a:t>A lower pitch than 256 Hz</a:t>
+            </a:r>
+          </a:p>
+          <a:p>
+            <a:pPr marL="514350" indent="-514350">
               <a:buFontTx/>
               <a:buAutoNum type="alphaLcParenR"/>
+              <a:defRPr/>
             </a:pPr>
             <a:r>
               <a:rPr lang="en-US" dirty="0"/>
-              <a:t>One is from the plane and one is a Newton's third law reaction</a:t>
-            </a:r>
-          </a:p>
-        </p:txBody>
-      </p:sp>
-      <p:sp>
-        <p:nvSpPr>
-          <p:cNvPr id="69634" name="Slide Number Placeholder 5"/>
-          <p:cNvSpPr>
-            <a:spLocks noGrp="1"/>
-          </p:cNvSpPr>
-          <p:nvPr>
-            <p:ph type="sldNum" sz="quarter" idx="12"/>
-          </p:nvPr>
-        </p:nvSpPr>
-        <p:spPr>
-          <a:noFill/>
-        </p:spPr>
-        <p:txBody>
-          <a:bodyPr/>
-          <a:lstStyle/>
-          <a:p>
-            <a:fld id="{0444647A-B62D-46AC-8BB6-871103D5B2E6}" type="slidenum">
-              <a:rPr lang="en-US" smtClean="0"/>
-              <a:pPr/>
-              <a:t>13</a:t>
-            </a:fld>
-            <a:endParaRPr lang="en-US"/>
+              <a:t>Middle C (256 Hz)</a:t>
+            </a:r>
+          </a:p>
+          <a:p>
+            <a:pPr marL="514350" indent="-514350">
+              <a:buFontTx/>
+              <a:buAutoNum type="alphaLcParenR"/>
+              <a:defRPr/>
+            </a:pPr>
+            <a:r>
+              <a:rPr lang="en-US" dirty="0"/>
+              <a:t>Nothing</a:t>
+            </a:r>
           </a:p>
         </p:txBody>
       </p:sp>
     </p:spTree>
     <p:extLst>
       <p:ext uri="{BB962C8B-B14F-4D97-AF65-F5344CB8AC3E}">
-        <p14:creationId xmlns:p14="http://schemas.microsoft.com/office/powerpoint/2010/main" val="2700378708"/>
+        <p14:creationId xmlns:p14="http://schemas.microsoft.com/office/powerpoint/2010/main" val="2918768208"/>
       </p:ext>
     </p:extLst>
   </p:cSld>
@@ -5322,6 +5576,153 @@
     <p:extLst>
       <p:ext uri="{BB962C8B-B14F-4D97-AF65-F5344CB8AC3E}">
         <p14:creationId xmlns:p14="http://schemas.microsoft.com/office/powerpoint/2010/main" val="665056197"/>
+      </p:ext>
+    </p:extLst>
+  </p:cSld>
+  <p:clrMapOvr>
+    <a:masterClrMapping/>
+  </p:clrMapOvr>
+</p:sld>
+</file>
+
+<file path=ppt/slides/slide18.xml><?xml version="1.0" encoding="utf-8"?>
+<p:sld xmlns:a="http://schemas.openxmlformats.org/drawingml/2006/main" xmlns:r="http://schemas.openxmlformats.org/officeDocument/2006/relationships" xmlns:p="http://schemas.openxmlformats.org/presentationml/2006/main">
+  <p:cSld>
+    <p:spTree>
+      <p:nvGrpSpPr>
+        <p:cNvPr id="1" name=""/>
+        <p:cNvGrpSpPr/>
+        <p:nvPr/>
+      </p:nvGrpSpPr>
+      <p:grpSpPr>
+        <a:xfrm>
+          <a:off x="0" y="0"/>
+          <a:ext cx="0" cy="0"/>
+          <a:chOff x="0" y="0"/>
+          <a:chExt cx="0" cy="0"/>
+        </a:xfrm>
+      </p:grpSpPr>
+      <p:sp>
+        <p:nvSpPr>
+          <p:cNvPr id="69635" name="Rectangle 2"/>
+          <p:cNvSpPr>
+            <a:spLocks noGrp="1" noChangeArrowheads="1"/>
+          </p:cNvSpPr>
+          <p:nvPr>
+            <p:ph type="title"/>
+          </p:nvPr>
+        </p:nvSpPr>
+        <p:spPr/>
+        <p:txBody>
+          <a:bodyPr/>
+          <a:lstStyle/>
+          <a:p>
+            <a:pPr eaLnBrk="1" hangingPunct="1"/>
+            <a:r>
+              <a:rPr lang="en-US" dirty="0"/>
+              <a:t>Question 225.5.4</a:t>
+            </a:r>
+          </a:p>
+        </p:txBody>
+      </p:sp>
+      <p:sp>
+        <p:nvSpPr>
+          <p:cNvPr id="69636" name="Rectangle 3"/>
+          <p:cNvSpPr>
+            <a:spLocks noGrp="1" noChangeArrowheads="1"/>
+          </p:cNvSpPr>
+          <p:nvPr>
+            <p:ph idx="1"/>
+          </p:nvPr>
+        </p:nvSpPr>
+        <p:spPr/>
+        <p:txBody>
+          <a:bodyPr/>
+          <a:lstStyle/>
+          <a:p>
+            <a:pPr marL="609600" indent="-609600" eaLnBrk="1" hangingPunct="1">
+              <a:lnSpc>
+                <a:spcPct val="90000"/>
+              </a:lnSpc>
+              <a:buFontTx/>
+              <a:buNone/>
+            </a:pPr>
+            <a:r>
+              <a:rPr lang="en-US" dirty="0"/>
+              <a:t>Often a single jet will create two sonic booms, why?</a:t>
+            </a:r>
+          </a:p>
+          <a:p>
+            <a:pPr marL="609600" indent="-609600" eaLnBrk="1" hangingPunct="1">
+              <a:lnSpc>
+                <a:spcPct val="90000"/>
+              </a:lnSpc>
+              <a:buFontTx/>
+              <a:buAutoNum type="alphaLcParenR"/>
+            </a:pPr>
+            <a:r>
+              <a:rPr lang="en-US" dirty="0"/>
+              <a:t>One is from the plane and one is from the condensation trail that follows the plane</a:t>
+            </a:r>
+          </a:p>
+          <a:p>
+            <a:pPr marL="609600" indent="-609600" eaLnBrk="1" hangingPunct="1">
+              <a:lnSpc>
+                <a:spcPct val="90000"/>
+              </a:lnSpc>
+              <a:buFontTx/>
+              <a:buAutoNum type="alphaLcParenR"/>
+            </a:pPr>
+            <a:r>
+              <a:rPr lang="en-US" dirty="0"/>
+              <a:t>The nose and the tail both act as wave sources</a:t>
+            </a:r>
+          </a:p>
+          <a:p>
+            <a:pPr marL="609600" indent="-609600" eaLnBrk="1" hangingPunct="1">
+              <a:lnSpc>
+                <a:spcPct val="90000"/>
+              </a:lnSpc>
+              <a:buFontTx/>
+              <a:buAutoNum type="alphaLcParenR"/>
+            </a:pPr>
+            <a:r>
+              <a:rPr lang="en-US" dirty="0"/>
+              <a:t>One is from the plane and one is a Newton's third law reaction</a:t>
+            </a:r>
+          </a:p>
+        </p:txBody>
+      </p:sp>
+      <p:sp>
+        <p:nvSpPr>
+          <p:cNvPr id="69634" name="Slide Number Placeholder 5"/>
+          <p:cNvSpPr>
+            <a:spLocks noGrp="1"/>
+          </p:cNvSpPr>
+          <p:nvPr>
+            <p:ph type="sldNum" sz="quarter" idx="12"/>
+          </p:nvPr>
+        </p:nvSpPr>
+        <p:spPr>
+          <a:noFill/>
+        </p:spPr>
+        <p:txBody>
+          <a:bodyPr/>
+          <a:lstStyle/>
+          <a:p>
+            <a:fld id="{0444647A-B62D-46AC-8BB6-871103D5B2E6}" type="slidenum">
+              <a:rPr lang="en-US" smtClean="0"/>
+              <a:pPr/>
+              <a:t>18</a:t>
+            </a:fld>
+            <a:endParaRPr lang="en-US"/>
+          </a:p>
+        </p:txBody>
+      </p:sp>
+    </p:spTree>
+    <p:extLst>
+      <p:ext uri="{BB962C8B-B14F-4D97-AF65-F5344CB8AC3E}">
+        <p14:creationId xmlns:p14="http://schemas.microsoft.com/office/powerpoint/2010/main" val="2700378708"/>
       </p:ext>
     </p:extLst>
   </p:cSld>
@@ -7418,6 +7819,118 @@
       </p:grpSpPr>
       <p:sp>
         <p:nvSpPr>
+          <p:cNvPr id="2" name="Title 1">
+            <a:extLst>
+              <a:ext uri="{FF2B5EF4-FFF2-40B4-BE49-F238E27FC236}">
+                <a16:creationId xmlns:a16="http://schemas.microsoft.com/office/drawing/2014/main" id="{974B74E6-6806-4E3B-6B2F-6835AC6B98BF}"/>
+              </a:ext>
+            </a:extLst>
+          </p:cNvPr>
+          <p:cNvSpPr>
+            <a:spLocks noGrp="1"/>
+          </p:cNvSpPr>
+          <p:nvPr>
+            <p:ph type="title"/>
+          </p:nvPr>
+        </p:nvSpPr>
+        <p:spPr/>
+        <p:txBody>
+          <a:bodyPr/>
+          <a:lstStyle/>
+          <a:p>
+            <a:r>
+              <a:rPr lang="en-US" dirty="0"/>
+              <a:t>Demonstration</a:t>
+            </a:r>
+          </a:p>
+        </p:txBody>
+      </p:sp>
+      <p:sp>
+        <p:nvSpPr>
+          <p:cNvPr id="3" name="Content Placeholder 2">
+            <a:extLst>
+              <a:ext uri="{FF2B5EF4-FFF2-40B4-BE49-F238E27FC236}">
+                <a16:creationId xmlns:a16="http://schemas.microsoft.com/office/drawing/2014/main" id="{32D2F1B5-ED77-092A-339A-73D1B416ECEA}"/>
+              </a:ext>
+            </a:extLst>
+          </p:cNvPr>
+          <p:cNvSpPr>
+            <a:spLocks noGrp="1"/>
+          </p:cNvSpPr>
+          <p:nvPr>
+            <p:ph idx="1"/>
+          </p:nvPr>
+        </p:nvSpPr>
+        <p:spPr>
+          <a:xfrm>
+            <a:off x="304800" y="1600200"/>
+            <a:ext cx="8229600" cy="4525963"/>
+          </a:xfrm>
+        </p:spPr>
+        <p:txBody>
+          <a:bodyPr/>
+          <a:lstStyle/>
+          <a:p>
+            <a:r>
+              <a:rPr lang="en-US" dirty="0">
+                <a:hlinkClick r:id="rId2"/>
+              </a:rPr>
+              <a:t>https://astro.unl.edu/classaction/animations/light/dopplershift.html</a:t>
+            </a:r>
+            <a:endParaRPr lang="en-US" dirty="0"/>
+          </a:p>
+          <a:p>
+            <a:endParaRPr lang="en-US" dirty="0"/>
+          </a:p>
+          <a:p>
+            <a:endParaRPr lang="en-US" dirty="0"/>
+          </a:p>
+          <a:p>
+            <a:r>
+              <a:rPr lang="en-US" dirty="0">
+                <a:hlinkClick r:id="rId3"/>
+              </a:rPr>
+              <a:t>https://ophysics.com/w11.html</a:t>
+            </a:r>
+            <a:r>
+              <a:rPr lang="en-US" dirty="0"/>
+              <a:t> </a:t>
+            </a:r>
+          </a:p>
+        </p:txBody>
+      </p:sp>
+    </p:spTree>
+    <p:extLst>
+      <p:ext uri="{BB962C8B-B14F-4D97-AF65-F5344CB8AC3E}">
+        <p14:creationId xmlns:p14="http://schemas.microsoft.com/office/powerpoint/2010/main" val="761006191"/>
+      </p:ext>
+    </p:extLst>
+  </p:cSld>
+  <p:clrMapOvr>
+    <a:masterClrMapping/>
+  </p:clrMapOvr>
+</p:sld>
+</file>
+
+<file path=ppt/slides/slide9.xml><?xml version="1.0" encoding="utf-8"?>
+<p:sld xmlns:a="http://schemas.openxmlformats.org/drawingml/2006/main" xmlns:r="http://schemas.openxmlformats.org/officeDocument/2006/relationships" xmlns:p="http://schemas.openxmlformats.org/presentationml/2006/main">
+  <p:cSld>
+    <p:spTree>
+      <p:nvGrpSpPr>
+        <p:cNvPr id="1" name=""/>
+        <p:cNvGrpSpPr/>
+        <p:nvPr/>
+      </p:nvGrpSpPr>
+      <p:grpSpPr>
+        <a:xfrm>
+          <a:off x="0" y="0"/>
+          <a:ext cx="0" cy="0"/>
+          <a:chOff x="0" y="0"/>
+          <a:chExt cx="0" cy="0"/>
+        </a:xfrm>
+      </p:grpSpPr>
+      <p:sp>
+        <p:nvSpPr>
           <p:cNvPr id="39938" name="Rectangle 2"/>
           <p:cNvSpPr>
             <a:spLocks noGrp="1" noChangeArrowheads="1"/>
@@ -8033,415 +8546,6 @@
 </p:sld>
 </file>
 
-<file path=ppt/slides/slide9.xml><?xml version="1.0" encoding="utf-8"?>
-<p:sld xmlns:a="http://schemas.openxmlformats.org/drawingml/2006/main" xmlns:r="http://schemas.openxmlformats.org/officeDocument/2006/relationships" xmlns:p="http://schemas.openxmlformats.org/presentationml/2006/main">
-  <p:cSld>
-    <p:spTree>
-      <p:nvGrpSpPr>
-        <p:cNvPr id="1" name=""/>
-        <p:cNvGrpSpPr/>
-        <p:nvPr/>
-      </p:nvGrpSpPr>
-      <p:grpSpPr>
-        <a:xfrm>
-          <a:off x="0" y="0"/>
-          <a:ext cx="0" cy="0"/>
-          <a:chOff x="0" y="0"/>
-          <a:chExt cx="0" cy="0"/>
-        </a:xfrm>
-      </p:grpSpPr>
-      <p:sp>
-        <p:nvSpPr>
-          <p:cNvPr id="40962" name="Rectangle 2"/>
-          <p:cNvSpPr>
-            <a:spLocks noGrp="1" noChangeArrowheads="1"/>
-          </p:cNvSpPr>
-          <p:nvPr>
-            <p:ph type="title"/>
-          </p:nvPr>
-        </p:nvSpPr>
-        <p:spPr/>
-        <p:txBody>
-          <a:bodyPr/>
-          <a:lstStyle/>
-          <a:p>
-            <a:pPr eaLnBrk="1" hangingPunct="1"/>
-            <a:r>
-              <a:rPr lang="en-US"/>
-              <a:t>Moving Detector</a:t>
-            </a:r>
-          </a:p>
-        </p:txBody>
-      </p:sp>
-      <p:grpSp>
-        <p:nvGrpSpPr>
-          <p:cNvPr id="2" name="Group 4"/>
-          <p:cNvGrpSpPr>
-            <a:grpSpLocks/>
-          </p:cNvGrpSpPr>
-          <p:nvPr/>
-        </p:nvGrpSpPr>
-        <p:grpSpPr bwMode="auto">
-          <a:xfrm>
-            <a:off x="2517775" y="1895475"/>
-            <a:ext cx="4557713" cy="4386263"/>
-            <a:chOff x="1586" y="1194"/>
-            <a:chExt cx="2871" cy="2763"/>
-          </a:xfrm>
-        </p:grpSpPr>
-        <p:grpSp>
-          <p:nvGrpSpPr>
-            <p:cNvPr id="3" name="Group 5"/>
-            <p:cNvGrpSpPr>
-              <a:grpSpLocks/>
-            </p:cNvGrpSpPr>
-            <p:nvPr/>
-          </p:nvGrpSpPr>
-          <p:grpSpPr bwMode="auto">
-            <a:xfrm>
-              <a:off x="1586" y="1194"/>
-              <a:ext cx="2871" cy="2763"/>
-              <a:chOff x="1056" y="1824"/>
-              <a:chExt cx="1536" cy="1584"/>
-            </a:xfrm>
-          </p:grpSpPr>
-          <p:sp>
-            <p:nvSpPr>
-              <p:cNvPr id="40968" name="Oval 6"/>
-              <p:cNvSpPr>
-                <a:spLocks noChangeArrowheads="1"/>
-              </p:cNvSpPr>
-              <p:nvPr/>
-            </p:nvSpPr>
-            <p:spPr bwMode="auto">
-              <a:xfrm>
-                <a:off x="1056" y="1824"/>
-                <a:ext cx="1536" cy="1584"/>
-              </a:xfrm>
-              <a:prstGeom prst="ellipse">
-                <a:avLst/>
-              </a:prstGeom>
-              <a:solidFill>
-                <a:srgbClr val="FFFFFF"/>
-              </a:solidFill>
-              <a:ln w="9525" algn="ctr">
-                <a:solidFill>
-                  <a:schemeClr val="tx1"/>
-                </a:solidFill>
-                <a:round/>
-                <a:headEnd/>
-                <a:tailEnd/>
-              </a:ln>
-            </p:spPr>
-            <p:txBody>
-              <a:bodyPr wrap="none" anchor="ctr"/>
-              <a:lstStyle/>
-              <a:p>
-                <a:endParaRPr lang="en-US"/>
-              </a:p>
-            </p:txBody>
-          </p:sp>
-          <p:sp>
-            <p:nvSpPr>
-              <p:cNvPr id="40969" name="Oval 7"/>
-              <p:cNvSpPr>
-                <a:spLocks noChangeArrowheads="1"/>
-              </p:cNvSpPr>
-              <p:nvPr/>
-            </p:nvSpPr>
-            <p:spPr bwMode="auto">
-              <a:xfrm>
-                <a:off x="1224" y="1992"/>
-                <a:ext cx="1200" cy="1248"/>
-              </a:xfrm>
-              <a:prstGeom prst="ellipse">
-                <a:avLst/>
-              </a:prstGeom>
-              <a:solidFill>
-                <a:srgbClr val="FFFFFF"/>
-              </a:solidFill>
-              <a:ln w="9525" algn="ctr">
-                <a:solidFill>
-                  <a:schemeClr val="tx1"/>
-                </a:solidFill>
-                <a:round/>
-                <a:headEnd/>
-                <a:tailEnd/>
-              </a:ln>
-            </p:spPr>
-            <p:txBody>
-              <a:bodyPr wrap="none" anchor="ctr"/>
-              <a:lstStyle/>
-              <a:p>
-                <a:endParaRPr lang="en-US"/>
-              </a:p>
-            </p:txBody>
-          </p:sp>
-          <p:sp>
-            <p:nvSpPr>
-              <p:cNvPr id="40970" name="Oval 8"/>
-              <p:cNvSpPr>
-                <a:spLocks noChangeArrowheads="1"/>
-              </p:cNvSpPr>
-              <p:nvPr/>
-            </p:nvSpPr>
-            <p:spPr bwMode="auto">
-              <a:xfrm>
-                <a:off x="1392" y="2136"/>
-                <a:ext cx="864" cy="960"/>
-              </a:xfrm>
-              <a:prstGeom prst="ellipse">
-                <a:avLst/>
-              </a:prstGeom>
-              <a:solidFill>
-                <a:srgbClr val="FFFFFF"/>
-              </a:solidFill>
-              <a:ln w="9525" algn="ctr">
-                <a:solidFill>
-                  <a:schemeClr val="tx1"/>
-                </a:solidFill>
-                <a:round/>
-                <a:headEnd/>
-                <a:tailEnd/>
-              </a:ln>
-            </p:spPr>
-            <p:txBody>
-              <a:bodyPr wrap="none" anchor="ctr"/>
-              <a:lstStyle/>
-              <a:p>
-                <a:endParaRPr lang="en-US"/>
-              </a:p>
-            </p:txBody>
-          </p:sp>
-          <p:sp>
-            <p:nvSpPr>
-              <p:cNvPr id="40971" name="Oval 9"/>
-              <p:cNvSpPr>
-                <a:spLocks noChangeArrowheads="1"/>
-              </p:cNvSpPr>
-              <p:nvPr/>
-            </p:nvSpPr>
-            <p:spPr bwMode="auto">
-              <a:xfrm>
-                <a:off x="1512" y="2256"/>
-                <a:ext cx="624" cy="720"/>
-              </a:xfrm>
-              <a:prstGeom prst="ellipse">
-                <a:avLst/>
-              </a:prstGeom>
-              <a:solidFill>
-                <a:srgbClr val="FFFFFF"/>
-              </a:solidFill>
-              <a:ln w="9525" algn="ctr">
-                <a:solidFill>
-                  <a:schemeClr val="tx1"/>
-                </a:solidFill>
-                <a:round/>
-                <a:headEnd/>
-                <a:tailEnd/>
-              </a:ln>
-            </p:spPr>
-            <p:txBody>
-              <a:bodyPr wrap="none" anchor="ctr"/>
-              <a:lstStyle/>
-              <a:p>
-                <a:endParaRPr lang="en-US"/>
-              </a:p>
-            </p:txBody>
-          </p:sp>
-          <p:sp>
-            <p:nvSpPr>
-              <p:cNvPr id="40972" name="Oval 10"/>
-              <p:cNvSpPr>
-                <a:spLocks noChangeArrowheads="1"/>
-              </p:cNvSpPr>
-              <p:nvPr/>
-            </p:nvSpPr>
-            <p:spPr bwMode="auto">
-              <a:xfrm>
-                <a:off x="1644" y="2400"/>
-                <a:ext cx="360" cy="432"/>
-              </a:xfrm>
-              <a:prstGeom prst="ellipse">
-                <a:avLst/>
-              </a:prstGeom>
-              <a:solidFill>
-                <a:srgbClr val="FFFFFF"/>
-              </a:solidFill>
-              <a:ln w="9525" algn="ctr">
-                <a:solidFill>
-                  <a:schemeClr val="tx1"/>
-                </a:solidFill>
-                <a:round/>
-                <a:headEnd/>
-                <a:tailEnd/>
-              </a:ln>
-            </p:spPr>
-            <p:txBody>
-              <a:bodyPr wrap="none" anchor="ctr"/>
-              <a:lstStyle/>
-              <a:p>
-                <a:endParaRPr lang="en-US"/>
-              </a:p>
-            </p:txBody>
-          </p:sp>
-          <p:sp>
-            <p:nvSpPr>
-              <p:cNvPr id="40973" name="Oval 11"/>
-              <p:cNvSpPr>
-                <a:spLocks noChangeArrowheads="1"/>
-              </p:cNvSpPr>
-              <p:nvPr/>
-            </p:nvSpPr>
-            <p:spPr bwMode="auto">
-              <a:xfrm>
-                <a:off x="1752" y="2520"/>
-                <a:ext cx="144" cy="192"/>
-              </a:xfrm>
-              <a:prstGeom prst="ellipse">
-                <a:avLst/>
-              </a:prstGeom>
-              <a:solidFill>
-                <a:srgbClr val="FFFFFF"/>
-              </a:solidFill>
-              <a:ln w="9525" algn="ctr">
-                <a:solidFill>
-                  <a:schemeClr val="tx1"/>
-                </a:solidFill>
-                <a:round/>
-                <a:headEnd/>
-                <a:tailEnd/>
-              </a:ln>
-            </p:spPr>
-            <p:txBody>
-              <a:bodyPr wrap="none" anchor="ctr"/>
-              <a:lstStyle/>
-              <a:p>
-                <a:endParaRPr lang="en-US"/>
-              </a:p>
-            </p:txBody>
-          </p:sp>
-          <p:sp>
-            <p:nvSpPr>
-              <p:cNvPr id="40974" name="Oval 12"/>
-              <p:cNvSpPr>
-                <a:spLocks noChangeArrowheads="1"/>
-              </p:cNvSpPr>
-              <p:nvPr/>
-            </p:nvSpPr>
-            <p:spPr bwMode="auto">
-              <a:xfrm>
-                <a:off x="1800" y="2592"/>
-                <a:ext cx="48" cy="48"/>
-              </a:xfrm>
-              <a:prstGeom prst="ellipse">
-                <a:avLst/>
-              </a:prstGeom>
-              <a:solidFill>
-                <a:schemeClr val="tx1"/>
-              </a:solidFill>
-              <a:ln w="9525" algn="ctr">
-                <a:solidFill>
-                  <a:schemeClr val="tx1"/>
-                </a:solidFill>
-                <a:round/>
-                <a:headEnd/>
-                <a:tailEnd/>
-              </a:ln>
-            </p:spPr>
-            <p:txBody>
-              <a:bodyPr wrap="none" anchor="ctr"/>
-              <a:lstStyle/>
-              <a:p>
-                <a:endParaRPr lang="en-US"/>
-              </a:p>
-            </p:txBody>
-          </p:sp>
-        </p:grpSp>
-        <p:sp>
-          <p:nvSpPr>
-            <p:cNvPr id="40966" name="Oval 13"/>
-            <p:cNvSpPr>
-              <a:spLocks noChangeArrowheads="1"/>
-            </p:cNvSpPr>
-            <p:nvPr/>
-          </p:nvSpPr>
-          <p:spPr bwMode="auto">
-            <a:xfrm>
-              <a:off x="3927" y="2455"/>
-              <a:ext cx="119" cy="119"/>
-            </a:xfrm>
-            <a:prstGeom prst="ellipse">
-              <a:avLst/>
-            </a:prstGeom>
-            <a:solidFill>
-              <a:schemeClr val="accent1"/>
-            </a:solidFill>
-            <a:ln w="9525" algn="ctr">
-              <a:solidFill>
-                <a:schemeClr val="tx1"/>
-              </a:solidFill>
-              <a:round/>
-              <a:headEnd/>
-              <a:tailEnd/>
-            </a:ln>
-          </p:spPr>
-          <p:txBody>
-            <a:bodyPr wrap="none" anchor="ctr"/>
-            <a:lstStyle/>
-            <a:p>
-              <a:endParaRPr lang="en-US"/>
-            </a:p>
-          </p:txBody>
-        </p:sp>
-        <p:sp>
-          <p:nvSpPr>
-            <p:cNvPr id="40967" name="Line 14"/>
-            <p:cNvSpPr>
-              <a:spLocks noChangeShapeType="1"/>
-            </p:cNvSpPr>
-            <p:nvPr/>
-          </p:nvSpPr>
-          <p:spPr bwMode="auto">
-            <a:xfrm flipH="1">
-              <a:off x="3675" y="2515"/>
-              <a:ext cx="256" cy="0"/>
-            </a:xfrm>
-            <a:prstGeom prst="line">
-              <a:avLst/>
-            </a:prstGeom>
-            <a:noFill/>
-            <a:ln w="38100">
-              <a:solidFill>
-                <a:srgbClr val="FF0000"/>
-              </a:solidFill>
-              <a:round/>
-              <a:headEnd/>
-              <a:tailEnd type="triangle" w="med" len="med"/>
-            </a:ln>
-          </p:spPr>
-          <p:txBody>
-            <a:bodyPr wrap="none" anchor="ctr"/>
-            <a:lstStyle/>
-            <a:p>
-              <a:endParaRPr lang="en-US"/>
-            </a:p>
-          </p:txBody>
-        </p:sp>
-      </p:grpSp>
-    </p:spTree>
-    <p:extLst>
-      <p:ext uri="{BB962C8B-B14F-4D97-AF65-F5344CB8AC3E}">
-        <p14:creationId xmlns:p14="http://schemas.microsoft.com/office/powerpoint/2010/main" val="1734463390"/>
-      </p:ext>
-    </p:extLst>
-  </p:cSld>
-  <p:clrMapOvr>
-    <a:masterClrMapping/>
-  </p:clrMapOvr>
-</p:sld>
-</file>
-
 <file path=ppt/theme/theme1.xml><?xml version="1.0" encoding="utf-8"?>
 <a:theme xmlns:a="http://schemas.openxmlformats.org/drawingml/2006/main" name="Office Theme">
   <a:themeElements>

</xml_diff>